<commit_message>
Updated some figures for readability.
</commit_message>
<xml_diff>
--- a/paper/sigmod2016/figs/structures.pptx
+++ b/paper/sigmod2016/figs/structures.pptx
@@ -200,7 +200,7 @@
           <a:p>
             <a:fld id="{3A271478-9337-FB4D-8AB0-86E8FBC95941}" type="datetimeFigureOut">
               <a:rPr lang="en-US" smtClean="0"/>
-              <a:t>11/16/15</a:t>
+              <a:t>11/17/15</a:t>
             </a:fld>
             <a:endParaRPr lang="en-US"/>
           </a:p>
@@ -817,7 +817,7 @@
           <a:p>
             <a:fld id="{2A3C5F88-9950-2441-8A51-A5268CD91903}" type="datetimeFigureOut">
               <a:rPr lang="en-US" smtClean="0"/>
-              <a:t>11/16/15</a:t>
+              <a:t>11/17/15</a:t>
             </a:fld>
             <a:endParaRPr lang="en-US"/>
           </a:p>
@@ -987,7 +987,7 @@
           <a:p>
             <a:fld id="{2A3C5F88-9950-2441-8A51-A5268CD91903}" type="datetimeFigureOut">
               <a:rPr lang="en-US" smtClean="0"/>
-              <a:t>11/16/15</a:t>
+              <a:t>11/17/15</a:t>
             </a:fld>
             <a:endParaRPr lang="en-US"/>
           </a:p>
@@ -1167,7 +1167,7 @@
           <a:p>
             <a:fld id="{2A3C5F88-9950-2441-8A51-A5268CD91903}" type="datetimeFigureOut">
               <a:rPr lang="en-US" smtClean="0"/>
-              <a:t>11/16/15</a:t>
+              <a:t>11/17/15</a:t>
             </a:fld>
             <a:endParaRPr lang="en-US"/>
           </a:p>
@@ -1337,7 +1337,7 @@
           <a:p>
             <a:fld id="{2A3C5F88-9950-2441-8A51-A5268CD91903}" type="datetimeFigureOut">
               <a:rPr lang="en-US" smtClean="0"/>
-              <a:t>11/16/15</a:t>
+              <a:t>11/17/15</a:t>
             </a:fld>
             <a:endParaRPr lang="en-US"/>
           </a:p>
@@ -1583,7 +1583,7 @@
           <a:p>
             <a:fld id="{2A3C5F88-9950-2441-8A51-A5268CD91903}" type="datetimeFigureOut">
               <a:rPr lang="en-US" smtClean="0"/>
-              <a:t>11/16/15</a:t>
+              <a:t>11/17/15</a:t>
             </a:fld>
             <a:endParaRPr lang="en-US"/>
           </a:p>
@@ -1871,7 +1871,7 @@
           <a:p>
             <a:fld id="{2A3C5F88-9950-2441-8A51-A5268CD91903}" type="datetimeFigureOut">
               <a:rPr lang="en-US" smtClean="0"/>
-              <a:t>11/16/15</a:t>
+              <a:t>11/17/15</a:t>
             </a:fld>
             <a:endParaRPr lang="en-US"/>
           </a:p>
@@ -2293,7 +2293,7 @@
           <a:p>
             <a:fld id="{2A3C5F88-9950-2441-8A51-A5268CD91903}" type="datetimeFigureOut">
               <a:rPr lang="en-US" smtClean="0"/>
-              <a:t>11/16/15</a:t>
+              <a:t>11/17/15</a:t>
             </a:fld>
             <a:endParaRPr lang="en-US"/>
           </a:p>
@@ -2411,7 +2411,7 @@
           <a:p>
             <a:fld id="{2A3C5F88-9950-2441-8A51-A5268CD91903}" type="datetimeFigureOut">
               <a:rPr lang="en-US" smtClean="0"/>
-              <a:t>11/16/15</a:t>
+              <a:t>11/17/15</a:t>
             </a:fld>
             <a:endParaRPr lang="en-US"/>
           </a:p>
@@ -2506,7 +2506,7 @@
           <a:p>
             <a:fld id="{2A3C5F88-9950-2441-8A51-A5268CD91903}" type="datetimeFigureOut">
               <a:rPr lang="en-US" smtClean="0"/>
-              <a:t>11/16/15</a:t>
+              <a:t>11/17/15</a:t>
             </a:fld>
             <a:endParaRPr lang="en-US"/>
           </a:p>
@@ -2783,7 +2783,7 @@
           <a:p>
             <a:fld id="{2A3C5F88-9950-2441-8A51-A5268CD91903}" type="datetimeFigureOut">
               <a:rPr lang="en-US" smtClean="0"/>
-              <a:t>11/16/15</a:t>
+              <a:t>11/17/15</a:t>
             </a:fld>
             <a:endParaRPr lang="en-US"/>
           </a:p>
@@ -3036,7 +3036,7 @@
           <a:p>
             <a:fld id="{2A3C5F88-9950-2441-8A51-A5268CD91903}" type="datetimeFigureOut">
               <a:rPr lang="en-US" smtClean="0"/>
-              <a:t>11/16/15</a:t>
+              <a:t>11/17/15</a:t>
             </a:fld>
             <a:endParaRPr lang="en-US"/>
           </a:p>
@@ -3249,7 +3249,7 @@
           <a:p>
             <a:fld id="{2A3C5F88-9950-2441-8A51-A5268CD91903}" type="datetimeFigureOut">
               <a:rPr lang="en-US" smtClean="0"/>
-              <a:t>11/16/15</a:t>
+              <a:t>11/17/15</a:t>
             </a:fld>
             <a:endParaRPr lang="en-US"/>
           </a:p>
@@ -17488,7 +17488,7 @@
           </a:prstGeom>
           <a:ln w="38100" cmpd="sng">
             <a:solidFill>
-              <a:srgbClr val="FF0000"/>
+              <a:srgbClr val="00C002"/>
             </a:solidFill>
             <a:tailEnd type="none"/>
           </a:ln>
@@ -17879,7 +17879,7 @@
           <p:nvPr>
             <p:extLst>
               <p:ext uri="{D42A27DB-BD31-4B8C-83A1-F6EECF244321}">
-                <p14:modId xmlns:p14="http://schemas.microsoft.com/office/powerpoint/2010/main" val="2528992526"/>
+                <p14:modId xmlns:p14="http://schemas.microsoft.com/office/powerpoint/2010/main" val="2213876014"/>
               </p:ext>
             </p:extLst>
           </p:nvPr>
@@ -18134,14 +18134,9 @@
                       <a:headEnd type="none" w="med" len="med"/>
                       <a:tailEnd type="none" w="med" len="med"/>
                     </a:lnB>
-                    <a:pattFill prst="pct5">
-                      <a:fgClr>
-                        <a:prstClr val="black"/>
-                      </a:fgClr>
-                      <a:bgClr>
-                        <a:schemeClr val="accent1"/>
-                      </a:bgClr>
-                    </a:pattFill>
+                    <a:solidFill>
+                      <a:srgbClr val="558ED1"/>
+                    </a:solidFill>
                   </a:tcPr>
                 </a:tc>
                 <a:tc rowSpan="3" hMerge="1">
@@ -18214,14 +18209,9 @@
                       <a:headEnd type="none" w="med" len="med"/>
                       <a:tailEnd type="none" w="med" len="med"/>
                     </a:lnB>
-                    <a:pattFill prst="ltUpDiag">
-                      <a:fgClr>
-                        <a:prstClr val="black"/>
-                      </a:fgClr>
-                      <a:bgClr>
-                        <a:srgbClr val="FFFF00"/>
-                      </a:bgClr>
-                    </a:pattFill>
+                    <a:solidFill>
+                      <a:srgbClr val="FFFF00"/>
+                    </a:solidFill>
                   </a:tcPr>
                 </a:tc>
                 <a:tc rowSpan="3" hMerge="1">
@@ -18492,14 +18482,9 @@
                       <a:headEnd type="none" w="med" len="med"/>
                       <a:tailEnd type="none" w="med" len="med"/>
                     </a:lnB>
-                    <a:pattFill prst="divot">
-                      <a:fgClr>
-                        <a:prstClr val="black"/>
-                      </a:fgClr>
-                      <a:bgClr>
-                        <a:srgbClr val="FF6600"/>
-                      </a:bgClr>
-                    </a:pattFill>
+                    <a:solidFill>
+                      <a:srgbClr val="FF0000"/>
+                    </a:solidFill>
                   </a:tcPr>
                 </a:tc>
                 <a:tc rowSpan="3" hMerge="1">
@@ -18572,14 +18557,9 @@
                       <a:headEnd type="none" w="med" len="med"/>
                       <a:tailEnd type="none" w="med" len="med"/>
                     </a:lnB>
-                    <a:pattFill prst="pct50">
-                      <a:fgClr>
-                        <a:prstClr val="black"/>
-                      </a:fgClr>
-                      <a:bgClr>
-                        <a:srgbClr val="FF0000"/>
-                      </a:bgClr>
-                    </a:pattFill>
+                    <a:solidFill>
+                      <a:srgbClr val="00C002"/>
+                    </a:solidFill>
                   </a:tcPr>
                 </a:tc>
                 <a:tc rowSpan="3" hMerge="1">
@@ -19527,7 +19507,7 @@
           </a:prstGeom>
           <a:ln w="38100" cmpd="sng">
             <a:solidFill>
-              <a:srgbClr val="FF6600"/>
+              <a:srgbClr val="FF0000"/>
             </a:solidFill>
             <a:tailEnd type="none"/>
           </a:ln>
@@ -19910,7 +19890,7 @@
           </a:prstGeom>
           <a:ln w="38100" cmpd="sng">
             <a:solidFill>
-              <a:srgbClr val="FF6600"/>
+              <a:srgbClr val="FF0000"/>
             </a:solidFill>
             <a:tailEnd type="none"/>
           </a:ln>
@@ -19983,7 +19963,7 @@
           </a:prstGeom>
           <a:ln w="38100" cmpd="sng">
             <a:solidFill>
-              <a:srgbClr val="FF6600"/>
+              <a:srgbClr val="FF0000"/>
             </a:solidFill>
             <a:tailEnd type="none"/>
           </a:ln>
@@ -20129,7 +20109,7 @@
           </a:prstGeom>
           <a:ln w="38100" cmpd="sng">
             <a:solidFill>
-              <a:srgbClr val="FF6600"/>
+              <a:srgbClr val="FF0000"/>
             </a:solidFill>
             <a:tailEnd type="none"/>
           </a:ln>
@@ -20203,7 +20183,7 @@
           </a:prstGeom>
           <a:ln w="38100" cmpd="sng">
             <a:solidFill>
-              <a:srgbClr val="FF0000"/>
+              <a:srgbClr val="00C002"/>
             </a:solidFill>
             <a:tailEnd type="none"/>
           </a:ln>
@@ -20276,7 +20256,7 @@
           </a:prstGeom>
           <a:ln>
             <a:solidFill>
-              <a:srgbClr val="FF0000"/>
+              <a:srgbClr val="00C002"/>
             </a:solidFill>
             <a:tailEnd type="none"/>
           </a:ln>
@@ -20427,7 +20407,7 @@
           </a:prstGeom>
           <a:ln w="38100" cmpd="sng">
             <a:solidFill>
-              <a:srgbClr val="FF0000"/>
+              <a:srgbClr val="00C002"/>
             </a:solidFill>
             <a:tailEnd type="none"/>
           </a:ln>
@@ -20500,7 +20480,7 @@
           </a:prstGeom>
           <a:ln w="38100" cmpd="sng">
             <a:solidFill>
-              <a:srgbClr val="FF0000"/>
+              <a:srgbClr val="00C002"/>
             </a:solidFill>
             <a:tailEnd type="none"/>
           </a:ln>
@@ -20783,7 +20763,7 @@
           <p:nvPr>
             <p:extLst>
               <p:ext uri="{D42A27DB-BD31-4B8C-83A1-F6EECF244321}">
-                <p14:modId xmlns:p14="http://schemas.microsoft.com/office/powerpoint/2010/main" val="2606035877"/>
+                <p14:modId xmlns:p14="http://schemas.microsoft.com/office/powerpoint/2010/main" val="3021528749"/>
               </p:ext>
             </p:extLst>
           </p:nvPr>
@@ -20951,14 +20931,9 @@
                       <a:headEnd type="none" w="med" len="med"/>
                       <a:tailEnd type="none" w="med" len="med"/>
                     </a:lnB>
-                    <a:pattFill prst="pct5">
-                      <a:fgClr>
-                        <a:schemeClr val="tx1"/>
-                      </a:fgClr>
-                      <a:bgClr>
-                        <a:schemeClr val="accent1"/>
-                      </a:bgClr>
-                    </a:pattFill>
+                    <a:solidFill>
+                      <a:srgbClr val="558ED1"/>
+                    </a:solidFill>
                   </a:tcPr>
                 </a:tc>
                 <a:tc>
@@ -21011,14 +20986,9 @@
                       <a:headEnd type="none" w="med" len="med"/>
                       <a:tailEnd type="none" w="med" len="med"/>
                     </a:lnB>
-                    <a:pattFill prst="ltUpDiag">
-                      <a:fgClr>
-                        <a:schemeClr val="tx1"/>
-                      </a:fgClr>
-                      <a:bgClr>
-                        <a:srgbClr val="FFFF00"/>
-                      </a:bgClr>
-                    </a:pattFill>
+                    <a:solidFill>
+                      <a:srgbClr val="FFFF00"/>
+                    </a:solidFill>
                   </a:tcPr>
                 </a:tc>
                 <a:tc>
@@ -21071,14 +21041,9 @@
                       <a:headEnd type="none" w="med" len="med"/>
                       <a:tailEnd type="none" w="med" len="med"/>
                     </a:lnB>
-                    <a:pattFill prst="divot">
-                      <a:fgClr>
-                        <a:schemeClr val="tx1"/>
-                      </a:fgClr>
-                      <a:bgClr>
-                        <a:srgbClr val="FF6600"/>
-                      </a:bgClr>
-                    </a:pattFill>
+                    <a:solidFill>
+                      <a:srgbClr val="FF0000"/>
+                    </a:solidFill>
                   </a:tcPr>
                 </a:tc>
                 <a:tc>
@@ -21131,14 +21096,9 @@
                       <a:headEnd type="none" w="med" len="med"/>
                       <a:tailEnd type="none" w="med" len="med"/>
                     </a:lnB>
-                    <a:pattFill prst="pct50">
-                      <a:fgClr>
-                        <a:schemeClr val="tx1"/>
-                      </a:fgClr>
-                      <a:bgClr>
-                        <a:srgbClr val="FF0000"/>
-                      </a:bgClr>
-                    </a:pattFill>
+                    <a:solidFill>
+                      <a:srgbClr val="00C002"/>
+                    </a:solidFill>
                   </a:tcPr>
                 </a:tc>
               </a:tr>
@@ -21404,7 +21364,7 @@
           <p:nvPr>
             <p:extLst>
               <p:ext uri="{D42A27DB-BD31-4B8C-83A1-F6EECF244321}">
-                <p14:modId xmlns:p14="http://schemas.microsoft.com/office/powerpoint/2010/main" val="1769150585"/>
+                <p14:modId xmlns:p14="http://schemas.microsoft.com/office/powerpoint/2010/main" val="1656404488"/>
               </p:ext>
             </p:extLst>
           </p:nvPr>
@@ -21789,14 +21749,9 @@
                     </a:p>
                   </a:txBody>
                   <a:tcPr marL="69151" marR="69151" marT="34576" marB="34576" anchor="ctr">
-                    <a:pattFill prst="pct5">
-                      <a:fgClr>
-                        <a:schemeClr val="tx1"/>
-                      </a:fgClr>
-                      <a:bgClr>
-                        <a:schemeClr val="accent1"/>
-                      </a:bgClr>
-                    </a:pattFill>
+                    <a:solidFill>
+                      <a:srgbClr val="558ED1"/>
+                    </a:solidFill>
                   </a:tcPr>
                 </a:tc>
                 <a:tc rowSpan="3" hMerge="1">
@@ -21863,14 +21818,9 @@
                     </a:p>
                   </a:txBody>
                   <a:tcPr marL="69151" marR="69151" marT="34576" marB="34576" anchor="ctr">
-                    <a:pattFill prst="divot">
-                      <a:fgClr>
-                        <a:schemeClr val="tx1"/>
-                      </a:fgClr>
-                      <a:bgClr>
-                        <a:srgbClr val="FF6600"/>
-                      </a:bgClr>
-                    </a:pattFill>
+                    <a:solidFill>
+                      <a:srgbClr val="FF0000"/>
+                    </a:solidFill>
                   </a:tcPr>
                 </a:tc>
                 <a:tc rowSpan="3" hMerge="1">
@@ -22225,14 +22175,9 @@
                     </a:p>
                   </a:txBody>
                   <a:tcPr marL="69151" marR="69151" marT="34576" marB="34576" anchor="ctr">
-                    <a:pattFill prst="ltUpDiag">
-                      <a:fgClr>
-                        <a:schemeClr val="tx1"/>
-                      </a:fgClr>
-                      <a:bgClr>
-                        <a:srgbClr val="FFFF00"/>
-                      </a:bgClr>
-                    </a:pattFill>
+                    <a:solidFill>
+                      <a:srgbClr val="FFFF00"/>
+                    </a:solidFill>
                   </a:tcPr>
                 </a:tc>
                 <a:tc rowSpan="3" hMerge="1">
@@ -22299,14 +22244,9 @@
                     </a:p>
                   </a:txBody>
                   <a:tcPr marL="69151" marR="69151" marT="34576" marB="34576" anchor="ctr">
-                    <a:pattFill prst="pct50">
-                      <a:fgClr>
-                        <a:schemeClr val="tx1"/>
-                      </a:fgClr>
-                      <a:bgClr>
-                        <a:srgbClr val="FF0000"/>
-                      </a:bgClr>
-                    </a:pattFill>
+                    <a:solidFill>
+                      <a:srgbClr val="00C002"/>
+                    </a:solidFill>
                   </a:tcPr>
                 </a:tc>
                 <a:tc rowSpan="3" hMerge="1">
@@ -23856,7 +23796,7 @@
           </a:prstGeom>
           <a:ln w="38100" cmpd="sng">
             <a:solidFill>
-              <a:srgbClr val="FF0000"/>
+              <a:srgbClr val="00C002"/>
             </a:solidFill>
             <a:tailEnd type="none"/>
           </a:ln>
@@ -23929,7 +23869,7 @@
           </a:prstGeom>
           <a:ln>
             <a:solidFill>
-              <a:srgbClr val="FF6600"/>
+              <a:srgbClr val="FF0000"/>
             </a:solidFill>
             <a:tailEnd type="none"/>
           </a:ln>
@@ -24080,7 +24020,7 @@
           </a:prstGeom>
           <a:ln w="38100" cmpd="sng">
             <a:solidFill>
-              <a:srgbClr val="FF6600"/>
+              <a:srgbClr val="FF0000"/>
             </a:solidFill>
             <a:tailEnd type="none"/>
           </a:ln>
@@ -24153,7 +24093,7 @@
           </a:prstGeom>
           <a:ln w="38100" cmpd="sng">
             <a:solidFill>
-              <a:srgbClr val="FF6600"/>
+              <a:srgbClr val="FF0000"/>
             </a:solidFill>
             <a:tailEnd type="none"/>
           </a:ln>

</xml_diff>